<commit_message>
Added background info to presentation
</commit_message>
<xml_diff>
--- a/reports/RedHat_Presentation.pptx
+++ b/reports/RedHat_Presentation.pptx
@@ -4,14 +4,20 @@
   <p:sldMasterIdLst>
     <p:sldMasterId id="2147483648" r:id="rId1"/>
   </p:sldMasterIdLst>
+  <p:notesMasterIdLst>
+    <p:notesMasterId r:id="rId12"/>
+  </p:notesMasterIdLst>
   <p:sldIdLst>
     <p:sldId id="256" r:id="rId2"/>
     <p:sldId id="257" r:id="rId3"/>
     <p:sldId id="259" r:id="rId4"/>
-    <p:sldId id="260" r:id="rId5"/>
-    <p:sldId id="261" r:id="rId6"/>
-    <p:sldId id="258" r:id="rId7"/>
-    <p:sldId id="262" r:id="rId8"/>
+    <p:sldId id="264" r:id="rId5"/>
+    <p:sldId id="260" r:id="rId6"/>
+    <p:sldId id="265" r:id="rId7"/>
+    <p:sldId id="261" r:id="rId8"/>
+    <p:sldId id="263" r:id="rId9"/>
+    <p:sldId id="258" r:id="rId10"/>
+    <p:sldId id="262" r:id="rId11"/>
   </p:sldIdLst>
   <p:sldSz cx="12192000" cy="6858000"/>
   <p:notesSz cx="6858000" cy="9144000"/>
@@ -118,6 +124,524 @@
 </p:presentation>
 </file>
 
+<file path=ppt/notesMasters/notesMaster1.xml><?xml version="1.0" encoding="utf-8"?>
+<p:notesMaster xmlns:a="http://schemas.openxmlformats.org/drawingml/2006/main" xmlns:r="http://schemas.openxmlformats.org/officeDocument/2006/relationships" xmlns:p="http://schemas.openxmlformats.org/presentationml/2006/main">
+  <p:cSld>
+    <p:bg>
+      <p:bgRef idx="1001">
+        <a:schemeClr val="bg1"/>
+      </p:bgRef>
+    </p:bg>
+    <p:spTree>
+      <p:nvGrpSpPr>
+        <p:cNvPr id="1" name=""/>
+        <p:cNvGrpSpPr/>
+        <p:nvPr/>
+      </p:nvGrpSpPr>
+      <p:grpSpPr>
+        <a:xfrm>
+          <a:off x="0" y="0"/>
+          <a:ext cx="0" cy="0"/>
+          <a:chOff x="0" y="0"/>
+          <a:chExt cx="0" cy="0"/>
+        </a:xfrm>
+      </p:grpSpPr>
+      <p:sp>
+        <p:nvSpPr>
+          <p:cNvPr id="2" name="Header Placeholder 1"/>
+          <p:cNvSpPr>
+            <a:spLocks noGrp="1"/>
+          </p:cNvSpPr>
+          <p:nvPr>
+            <p:ph type="hdr" sz="quarter"/>
+          </p:nvPr>
+        </p:nvSpPr>
+        <p:spPr>
+          <a:xfrm>
+            <a:off x="0" y="0"/>
+            <a:ext cx="2971800" cy="458788"/>
+          </a:xfrm>
+          <a:prstGeom prst="rect">
+            <a:avLst/>
+          </a:prstGeom>
+        </p:spPr>
+        <p:txBody>
+          <a:bodyPr vert="horz" lIns="91440" tIns="45720" rIns="91440" bIns="45720" rtlCol="0"/>
+          <a:lstStyle>
+            <a:lvl1pPr algn="l">
+              <a:defRPr sz="1200"/>
+            </a:lvl1pPr>
+          </a:lstStyle>
+          <a:p>
+            <a:endParaRPr lang="en-US"/>
+          </a:p>
+        </p:txBody>
+      </p:sp>
+      <p:sp>
+        <p:nvSpPr>
+          <p:cNvPr id="3" name="Date Placeholder 2"/>
+          <p:cNvSpPr>
+            <a:spLocks noGrp="1"/>
+          </p:cNvSpPr>
+          <p:nvPr>
+            <p:ph type="dt" idx="1"/>
+          </p:nvPr>
+        </p:nvSpPr>
+        <p:spPr>
+          <a:xfrm>
+            <a:off x="3884613" y="0"/>
+            <a:ext cx="2971800" cy="458788"/>
+          </a:xfrm>
+          <a:prstGeom prst="rect">
+            <a:avLst/>
+          </a:prstGeom>
+        </p:spPr>
+        <p:txBody>
+          <a:bodyPr vert="horz" lIns="91440" tIns="45720" rIns="91440" bIns="45720" rtlCol="0"/>
+          <a:lstStyle>
+            <a:lvl1pPr algn="r">
+              <a:defRPr sz="1200"/>
+            </a:lvl1pPr>
+          </a:lstStyle>
+          <a:p>
+            <a:fld id="{69409E05-1A56-D54D-A345-64CF5FB8EAC1}" type="datetimeFigureOut">
+              <a:rPr lang="en-US" smtClean="0"/>
+              <a:t>11/27/17</a:t>
+            </a:fld>
+            <a:endParaRPr lang="en-US"/>
+          </a:p>
+        </p:txBody>
+      </p:sp>
+      <p:sp>
+        <p:nvSpPr>
+          <p:cNvPr id="4" name="Slide Image Placeholder 3"/>
+          <p:cNvSpPr>
+            <a:spLocks noGrp="1" noRot="1" noChangeAspect="1"/>
+          </p:cNvSpPr>
+          <p:nvPr>
+            <p:ph type="sldImg" idx="2"/>
+          </p:nvPr>
+        </p:nvSpPr>
+        <p:spPr>
+          <a:xfrm>
+            <a:off x="685800" y="1143000"/>
+            <a:ext cx="5486400" cy="3086100"/>
+          </a:xfrm>
+          <a:prstGeom prst="rect">
+            <a:avLst/>
+          </a:prstGeom>
+          <a:noFill/>
+          <a:ln w="12700">
+            <a:solidFill>
+              <a:prstClr val="black"/>
+            </a:solidFill>
+          </a:ln>
+        </p:spPr>
+        <p:txBody>
+          <a:bodyPr vert="horz" lIns="91440" tIns="45720" rIns="91440" bIns="45720" rtlCol="0" anchor="ctr"/>
+          <a:lstStyle/>
+          <a:p>
+            <a:endParaRPr lang="en-US"/>
+          </a:p>
+        </p:txBody>
+      </p:sp>
+      <p:sp>
+        <p:nvSpPr>
+          <p:cNvPr id="5" name="Notes Placeholder 4"/>
+          <p:cNvSpPr>
+            <a:spLocks noGrp="1"/>
+          </p:cNvSpPr>
+          <p:nvPr>
+            <p:ph type="body" sz="quarter" idx="3"/>
+          </p:nvPr>
+        </p:nvSpPr>
+        <p:spPr>
+          <a:xfrm>
+            <a:off x="685800" y="4400550"/>
+            <a:ext cx="5486400" cy="3600450"/>
+          </a:xfrm>
+          <a:prstGeom prst="rect">
+            <a:avLst/>
+          </a:prstGeom>
+        </p:spPr>
+        <p:txBody>
+          <a:bodyPr vert="horz" lIns="91440" tIns="45720" rIns="91440" bIns="45720" rtlCol="0"/>
+          <a:lstStyle/>
+          <a:p>
+            <a:pPr lvl="0"/>
+            <a:r>
+              <a:rPr lang="en-US" smtClean="0"/>
+              <a:t>Click to edit Master text styles</a:t>
+            </a:r>
+          </a:p>
+          <a:p>
+            <a:pPr lvl="1"/>
+            <a:r>
+              <a:rPr lang="en-US" smtClean="0"/>
+              <a:t>Second level</a:t>
+            </a:r>
+          </a:p>
+          <a:p>
+            <a:pPr lvl="2"/>
+            <a:r>
+              <a:rPr lang="en-US" smtClean="0"/>
+              <a:t>Third level</a:t>
+            </a:r>
+          </a:p>
+          <a:p>
+            <a:pPr lvl="3"/>
+            <a:r>
+              <a:rPr lang="en-US" smtClean="0"/>
+              <a:t>Fourth level</a:t>
+            </a:r>
+          </a:p>
+          <a:p>
+            <a:pPr lvl="4"/>
+            <a:r>
+              <a:rPr lang="en-US" smtClean="0"/>
+              <a:t>Fifth level</a:t>
+            </a:r>
+            <a:endParaRPr lang="en-US"/>
+          </a:p>
+        </p:txBody>
+      </p:sp>
+      <p:sp>
+        <p:nvSpPr>
+          <p:cNvPr id="6" name="Footer Placeholder 5"/>
+          <p:cNvSpPr>
+            <a:spLocks noGrp="1"/>
+          </p:cNvSpPr>
+          <p:nvPr>
+            <p:ph type="ftr" sz="quarter" idx="4"/>
+          </p:nvPr>
+        </p:nvSpPr>
+        <p:spPr>
+          <a:xfrm>
+            <a:off x="0" y="8685213"/>
+            <a:ext cx="2971800" cy="458787"/>
+          </a:xfrm>
+          <a:prstGeom prst="rect">
+            <a:avLst/>
+          </a:prstGeom>
+        </p:spPr>
+        <p:txBody>
+          <a:bodyPr vert="horz" lIns="91440" tIns="45720" rIns="91440" bIns="45720" rtlCol="0" anchor="b"/>
+          <a:lstStyle>
+            <a:lvl1pPr algn="l">
+              <a:defRPr sz="1200"/>
+            </a:lvl1pPr>
+          </a:lstStyle>
+          <a:p>
+            <a:endParaRPr lang="en-US"/>
+          </a:p>
+        </p:txBody>
+      </p:sp>
+      <p:sp>
+        <p:nvSpPr>
+          <p:cNvPr id="7" name="Slide Number Placeholder 6"/>
+          <p:cNvSpPr>
+            <a:spLocks noGrp="1"/>
+          </p:cNvSpPr>
+          <p:nvPr>
+            <p:ph type="sldNum" sz="quarter" idx="5"/>
+          </p:nvPr>
+        </p:nvSpPr>
+        <p:spPr>
+          <a:xfrm>
+            <a:off x="3884613" y="8685213"/>
+            <a:ext cx="2971800" cy="458787"/>
+          </a:xfrm>
+          <a:prstGeom prst="rect">
+            <a:avLst/>
+          </a:prstGeom>
+        </p:spPr>
+        <p:txBody>
+          <a:bodyPr vert="horz" lIns="91440" tIns="45720" rIns="91440" bIns="45720" rtlCol="0" anchor="b"/>
+          <a:lstStyle>
+            <a:lvl1pPr algn="r">
+              <a:defRPr sz="1200"/>
+            </a:lvl1pPr>
+          </a:lstStyle>
+          <a:p>
+            <a:fld id="{313E6F08-B367-3B47-AF02-F44DFE6FC5BA}" type="slidenum">
+              <a:rPr lang="en-US" smtClean="0"/>
+              <a:t>‹#›</a:t>
+            </a:fld>
+            <a:endParaRPr lang="en-US"/>
+          </a:p>
+        </p:txBody>
+      </p:sp>
+    </p:spTree>
+    <p:extLst>
+      <p:ext uri="{BB962C8B-B14F-4D97-AF65-F5344CB8AC3E}">
+        <p14:creationId xmlns:p14="http://schemas.microsoft.com/office/powerpoint/2010/main" val="1694884840"/>
+      </p:ext>
+    </p:extLst>
+  </p:cSld>
+  <p:clrMap bg1="lt1" tx1="dk1" bg2="lt2" tx2="dk2" accent1="accent1" accent2="accent2" accent3="accent3" accent4="accent4" accent5="accent5" accent6="accent6" hlink="hlink" folHlink="folHlink"/>
+  <p:notesStyle>
+    <a:lvl1pPr marL="0" algn="l" defTabSz="914400" rtl="0" eaLnBrk="1" latinLnBrk="0" hangingPunct="1">
+      <a:defRPr sz="1200" kern="1200">
+        <a:solidFill>
+          <a:schemeClr val="tx1"/>
+        </a:solidFill>
+        <a:latin typeface="+mn-lt"/>
+        <a:ea typeface="+mn-ea"/>
+        <a:cs typeface="+mn-cs"/>
+      </a:defRPr>
+    </a:lvl1pPr>
+    <a:lvl2pPr marL="457200" algn="l" defTabSz="914400" rtl="0" eaLnBrk="1" latinLnBrk="0" hangingPunct="1">
+      <a:defRPr sz="1200" kern="1200">
+        <a:solidFill>
+          <a:schemeClr val="tx1"/>
+        </a:solidFill>
+        <a:latin typeface="+mn-lt"/>
+        <a:ea typeface="+mn-ea"/>
+        <a:cs typeface="+mn-cs"/>
+      </a:defRPr>
+    </a:lvl2pPr>
+    <a:lvl3pPr marL="914400" algn="l" defTabSz="914400" rtl="0" eaLnBrk="1" latinLnBrk="0" hangingPunct="1">
+      <a:defRPr sz="1200" kern="1200">
+        <a:solidFill>
+          <a:schemeClr val="tx1"/>
+        </a:solidFill>
+        <a:latin typeface="+mn-lt"/>
+        <a:ea typeface="+mn-ea"/>
+        <a:cs typeface="+mn-cs"/>
+      </a:defRPr>
+    </a:lvl3pPr>
+    <a:lvl4pPr marL="1371600" algn="l" defTabSz="914400" rtl="0" eaLnBrk="1" latinLnBrk="0" hangingPunct="1">
+      <a:defRPr sz="1200" kern="1200">
+        <a:solidFill>
+          <a:schemeClr val="tx1"/>
+        </a:solidFill>
+        <a:latin typeface="+mn-lt"/>
+        <a:ea typeface="+mn-ea"/>
+        <a:cs typeface="+mn-cs"/>
+      </a:defRPr>
+    </a:lvl4pPr>
+    <a:lvl5pPr marL="1828800" algn="l" defTabSz="914400" rtl="0" eaLnBrk="1" latinLnBrk="0" hangingPunct="1">
+      <a:defRPr sz="1200" kern="1200">
+        <a:solidFill>
+          <a:schemeClr val="tx1"/>
+        </a:solidFill>
+        <a:latin typeface="+mn-lt"/>
+        <a:ea typeface="+mn-ea"/>
+        <a:cs typeface="+mn-cs"/>
+      </a:defRPr>
+    </a:lvl5pPr>
+    <a:lvl6pPr marL="2286000" algn="l" defTabSz="914400" rtl="0" eaLnBrk="1" latinLnBrk="0" hangingPunct="1">
+      <a:defRPr sz="1200" kern="1200">
+        <a:solidFill>
+          <a:schemeClr val="tx1"/>
+        </a:solidFill>
+        <a:latin typeface="+mn-lt"/>
+        <a:ea typeface="+mn-ea"/>
+        <a:cs typeface="+mn-cs"/>
+      </a:defRPr>
+    </a:lvl6pPr>
+    <a:lvl7pPr marL="2743200" algn="l" defTabSz="914400" rtl="0" eaLnBrk="1" latinLnBrk="0" hangingPunct="1">
+      <a:defRPr sz="1200" kern="1200">
+        <a:solidFill>
+          <a:schemeClr val="tx1"/>
+        </a:solidFill>
+        <a:latin typeface="+mn-lt"/>
+        <a:ea typeface="+mn-ea"/>
+        <a:cs typeface="+mn-cs"/>
+      </a:defRPr>
+    </a:lvl7pPr>
+    <a:lvl8pPr marL="3200400" algn="l" defTabSz="914400" rtl="0" eaLnBrk="1" latinLnBrk="0" hangingPunct="1">
+      <a:defRPr sz="1200" kern="1200">
+        <a:solidFill>
+          <a:schemeClr val="tx1"/>
+        </a:solidFill>
+        <a:latin typeface="+mn-lt"/>
+        <a:ea typeface="+mn-ea"/>
+        <a:cs typeface="+mn-cs"/>
+      </a:defRPr>
+    </a:lvl8pPr>
+    <a:lvl9pPr marL="3657600" algn="l" defTabSz="914400" rtl="0" eaLnBrk="1" latinLnBrk="0" hangingPunct="1">
+      <a:defRPr sz="1200" kern="1200">
+        <a:solidFill>
+          <a:schemeClr val="tx1"/>
+        </a:solidFill>
+        <a:latin typeface="+mn-lt"/>
+        <a:ea typeface="+mn-ea"/>
+        <a:cs typeface="+mn-cs"/>
+      </a:defRPr>
+    </a:lvl9pPr>
+  </p:notesStyle>
+</p:notesMaster>
+</file>
+
+<file path=ppt/notesSlides/notesSlide1.xml><?xml version="1.0" encoding="utf-8"?>
+<p:notes xmlns:a="http://schemas.openxmlformats.org/drawingml/2006/main" xmlns:r="http://schemas.openxmlformats.org/officeDocument/2006/relationships" xmlns:p="http://schemas.openxmlformats.org/presentationml/2006/main">
+  <p:cSld>
+    <p:spTree>
+      <p:nvGrpSpPr>
+        <p:cNvPr id="1" name=""/>
+        <p:cNvGrpSpPr/>
+        <p:nvPr/>
+      </p:nvGrpSpPr>
+      <p:grpSpPr>
+        <a:xfrm>
+          <a:off x="0" y="0"/>
+          <a:ext cx="0" cy="0"/>
+          <a:chOff x="0" y="0"/>
+          <a:chExt cx="0" cy="0"/>
+        </a:xfrm>
+      </p:grpSpPr>
+      <p:sp>
+        <p:nvSpPr>
+          <p:cNvPr id="2" name="Slide Image Placeholder 1"/>
+          <p:cNvSpPr>
+            <a:spLocks noGrp="1" noRot="1" noChangeAspect="1"/>
+          </p:cNvSpPr>
+          <p:nvPr>
+            <p:ph type="sldImg"/>
+          </p:nvPr>
+        </p:nvSpPr>
+        <p:spPr/>
+      </p:sp>
+      <p:sp>
+        <p:nvSpPr>
+          <p:cNvPr id="3" name="Notes Placeholder 2"/>
+          <p:cNvSpPr>
+            <a:spLocks noGrp="1"/>
+          </p:cNvSpPr>
+          <p:nvPr>
+            <p:ph type="body" idx="1"/>
+          </p:nvPr>
+        </p:nvSpPr>
+        <p:spPr/>
+        <p:txBody>
+          <a:bodyPr/>
+          <a:lstStyle/>
+          <a:p>
+            <a:endParaRPr lang="en-US"/>
+          </a:p>
+        </p:txBody>
+      </p:sp>
+      <p:sp>
+        <p:nvSpPr>
+          <p:cNvPr id="4" name="Slide Number Placeholder 3"/>
+          <p:cNvSpPr>
+            <a:spLocks noGrp="1"/>
+          </p:cNvSpPr>
+          <p:nvPr>
+            <p:ph type="sldNum" sz="quarter" idx="10"/>
+          </p:nvPr>
+        </p:nvSpPr>
+        <p:spPr/>
+        <p:txBody>
+          <a:bodyPr/>
+          <a:lstStyle/>
+          <a:p>
+            <a:fld id="{313E6F08-B367-3B47-AF02-F44DFE6FC5BA}" type="slidenum">
+              <a:rPr lang="en-US" smtClean="0"/>
+              <a:t>1</a:t>
+            </a:fld>
+            <a:endParaRPr lang="en-US"/>
+          </a:p>
+        </p:txBody>
+      </p:sp>
+    </p:spTree>
+    <p:extLst>
+      <p:ext uri="{BB962C8B-B14F-4D97-AF65-F5344CB8AC3E}">
+        <p14:creationId xmlns:p14="http://schemas.microsoft.com/office/powerpoint/2010/main" val="1706412072"/>
+      </p:ext>
+    </p:extLst>
+  </p:cSld>
+  <p:clrMapOvr>
+    <a:masterClrMapping/>
+  </p:clrMapOvr>
+</p:notes>
+</file>
+
+<file path=ppt/notesSlides/notesSlide2.xml><?xml version="1.0" encoding="utf-8"?>
+<p:notes xmlns:a="http://schemas.openxmlformats.org/drawingml/2006/main" xmlns:r="http://schemas.openxmlformats.org/officeDocument/2006/relationships" xmlns:p="http://schemas.openxmlformats.org/presentationml/2006/main">
+  <p:cSld>
+    <p:spTree>
+      <p:nvGrpSpPr>
+        <p:cNvPr id="1" name=""/>
+        <p:cNvGrpSpPr/>
+        <p:nvPr/>
+      </p:nvGrpSpPr>
+      <p:grpSpPr>
+        <a:xfrm>
+          <a:off x="0" y="0"/>
+          <a:ext cx="0" cy="0"/>
+          <a:chOff x="0" y="0"/>
+          <a:chExt cx="0" cy="0"/>
+        </a:xfrm>
+      </p:grpSpPr>
+      <p:sp>
+        <p:nvSpPr>
+          <p:cNvPr id="2" name="Slide Image Placeholder 1"/>
+          <p:cNvSpPr>
+            <a:spLocks noGrp="1" noRot="1" noChangeAspect="1"/>
+          </p:cNvSpPr>
+          <p:nvPr>
+            <p:ph type="sldImg"/>
+          </p:nvPr>
+        </p:nvSpPr>
+        <p:spPr/>
+      </p:sp>
+      <p:sp>
+        <p:nvSpPr>
+          <p:cNvPr id="3" name="Notes Placeholder 2"/>
+          <p:cNvSpPr>
+            <a:spLocks noGrp="1"/>
+          </p:cNvSpPr>
+          <p:nvPr>
+            <p:ph type="body" idx="1"/>
+          </p:nvPr>
+        </p:nvSpPr>
+        <p:spPr/>
+        <p:txBody>
+          <a:bodyPr/>
+          <a:lstStyle/>
+          <a:p>
+            <a:endParaRPr lang="en-US"/>
+          </a:p>
+        </p:txBody>
+      </p:sp>
+      <p:sp>
+        <p:nvSpPr>
+          <p:cNvPr id="4" name="Slide Number Placeholder 3"/>
+          <p:cNvSpPr>
+            <a:spLocks noGrp="1"/>
+          </p:cNvSpPr>
+          <p:nvPr>
+            <p:ph type="sldNum" sz="quarter" idx="10"/>
+          </p:nvPr>
+        </p:nvSpPr>
+        <p:spPr/>
+        <p:txBody>
+          <a:bodyPr/>
+          <a:lstStyle/>
+          <a:p>
+            <a:fld id="{313E6F08-B367-3B47-AF02-F44DFE6FC5BA}" type="slidenum">
+              <a:rPr lang="en-US" smtClean="0"/>
+              <a:t>2</a:t>
+            </a:fld>
+            <a:endParaRPr lang="en-US"/>
+          </a:p>
+        </p:txBody>
+      </p:sp>
+    </p:spTree>
+    <p:extLst>
+      <p:ext uri="{BB962C8B-B14F-4D97-AF65-F5344CB8AC3E}">
+        <p14:creationId xmlns:p14="http://schemas.microsoft.com/office/powerpoint/2010/main" val="23588419"/>
+      </p:ext>
+    </p:extLst>
+  </p:cSld>
+  <p:clrMapOvr>
+    <a:masterClrMapping/>
+  </p:clrMapOvr>
+</p:notes>
+</file>
+
 <file path=ppt/slideLayouts/slideLayout1.xml><?xml version="1.0" encoding="utf-8"?>
 <p:sldLayout xmlns:a="http://schemas.openxmlformats.org/drawingml/2006/main" xmlns:r="http://schemas.openxmlformats.org/officeDocument/2006/relationships" xmlns:p="http://schemas.openxmlformats.org/presentationml/2006/main" type="title" preserve="1">
   <p:cSld name="Title Slide">
@@ -249,7 +773,7 @@
           <a:p>
             <a:fld id="{261B4C4F-285E-6C44-A171-ECB61C3B6F37}" type="datetimeFigureOut">
               <a:rPr lang="en-US" smtClean="0"/>
-              <a:t>11/25/17</a:t>
+              <a:t>11/27/17</a:t>
             </a:fld>
             <a:endParaRPr lang="en-US"/>
           </a:p>
@@ -419,7 +943,7 @@
           <a:p>
             <a:fld id="{261B4C4F-285E-6C44-A171-ECB61C3B6F37}" type="datetimeFigureOut">
               <a:rPr lang="en-US" smtClean="0"/>
-              <a:t>11/25/17</a:t>
+              <a:t>11/27/17</a:t>
             </a:fld>
             <a:endParaRPr lang="en-US"/>
           </a:p>
@@ -599,7 +1123,7 @@
           <a:p>
             <a:fld id="{261B4C4F-285E-6C44-A171-ECB61C3B6F37}" type="datetimeFigureOut">
               <a:rPr lang="en-US" smtClean="0"/>
-              <a:t>11/25/17</a:t>
+              <a:t>11/27/17</a:t>
             </a:fld>
             <a:endParaRPr lang="en-US"/>
           </a:p>
@@ -689,14 +1213,20 @@
         </p:nvSpPr>
         <p:spPr/>
         <p:txBody>
-          <a:bodyPr/>
-          <a:lstStyle/>
-          <a:p>
-            <a:r>
-              <a:rPr lang="en-US" smtClean="0"/>
+          <a:bodyPr>
+            <a:normAutofit/>
+          </a:bodyPr>
+          <a:lstStyle>
+            <a:lvl1pPr>
+              <a:defRPr sz="4800"/>
+            </a:lvl1pPr>
+          </a:lstStyle>
+          <a:p>
+            <a:r>
+              <a:rPr lang="en-US" dirty="0" smtClean="0"/>
               <a:t>Click to edit Master title style</a:t>
             </a:r>
-            <a:endParaRPr lang="en-US"/>
+            <a:endParaRPr lang="en-US" dirty="0"/>
           </a:p>
         </p:txBody>
       </p:sp>
@@ -712,43 +1242,61 @@
         </p:nvSpPr>
         <p:spPr/>
         <p:txBody>
-          <a:bodyPr/>
-          <a:lstStyle/>
+          <a:bodyPr>
+            <a:normAutofit/>
+          </a:bodyPr>
+          <a:lstStyle>
+            <a:lvl1pPr>
+              <a:defRPr sz="3200"/>
+            </a:lvl1pPr>
+            <a:lvl2pPr>
+              <a:defRPr sz="2800"/>
+            </a:lvl2pPr>
+            <a:lvl3pPr>
+              <a:defRPr sz="2400"/>
+            </a:lvl3pPr>
+            <a:lvl4pPr>
+              <a:defRPr sz="2000"/>
+            </a:lvl4pPr>
+            <a:lvl5pPr>
+              <a:defRPr sz="2000"/>
+            </a:lvl5pPr>
+          </a:lstStyle>
           <a:p>
             <a:pPr lvl="0"/>
             <a:r>
-              <a:rPr lang="en-US" smtClean="0"/>
+              <a:rPr lang="en-US" dirty="0" smtClean="0"/>
               <a:t>Click to edit Master text styles</a:t>
             </a:r>
           </a:p>
           <a:p>
             <a:pPr lvl="1"/>
             <a:r>
-              <a:rPr lang="en-US" smtClean="0"/>
+              <a:rPr lang="en-US" dirty="0" smtClean="0"/>
               <a:t>Second level</a:t>
             </a:r>
           </a:p>
           <a:p>
             <a:pPr lvl="2"/>
             <a:r>
-              <a:rPr lang="en-US" smtClean="0"/>
+              <a:rPr lang="en-US" dirty="0" smtClean="0"/>
               <a:t>Third level</a:t>
             </a:r>
           </a:p>
           <a:p>
             <a:pPr lvl="3"/>
             <a:r>
-              <a:rPr lang="en-US" smtClean="0"/>
+              <a:rPr lang="en-US" dirty="0" smtClean="0"/>
               <a:t>Fourth level</a:t>
             </a:r>
           </a:p>
           <a:p>
             <a:pPr lvl="4"/>
             <a:r>
-              <a:rPr lang="en-US" smtClean="0"/>
+              <a:rPr lang="en-US" dirty="0" smtClean="0"/>
               <a:t>Fifth level</a:t>
             </a:r>
-            <a:endParaRPr lang="en-US"/>
+            <a:endParaRPr lang="en-US" dirty="0"/>
           </a:p>
         </p:txBody>
       </p:sp>
@@ -769,7 +1317,7 @@
           <a:p>
             <a:fld id="{261B4C4F-285E-6C44-A171-ECB61C3B6F37}" type="datetimeFigureOut">
               <a:rPr lang="en-US" smtClean="0"/>
-              <a:t>11/25/17</a:t>
+              <a:t>11/27/17</a:t>
             </a:fld>
             <a:endParaRPr lang="en-US"/>
           </a:p>
@@ -827,6 +1375,13 @@
   <p:clrMapOvr>
     <a:masterClrMapping/>
   </p:clrMapOvr>
+  <p:timing>
+    <p:tnLst>
+      <p:par>
+        <p:cTn id="1" dur="indefinite" restart="never" nodeType="tmRoot"/>
+      </p:par>
+    </p:tnLst>
+  </p:timing>
 </p:sldLayout>
 </file>
 
@@ -1015,7 +1570,7 @@
           <a:p>
             <a:fld id="{261B4C4F-285E-6C44-A171-ECB61C3B6F37}" type="datetimeFigureOut">
               <a:rPr lang="en-US" smtClean="0"/>
-              <a:t>11/25/17</a:t>
+              <a:t>11/27/17</a:t>
             </a:fld>
             <a:endParaRPr lang="en-US"/>
           </a:p>
@@ -1247,7 +1802,7 @@
           <a:p>
             <a:fld id="{261B4C4F-285E-6C44-A171-ECB61C3B6F37}" type="datetimeFigureOut">
               <a:rPr lang="en-US" smtClean="0"/>
-              <a:t>11/25/17</a:t>
+              <a:t>11/27/17</a:t>
             </a:fld>
             <a:endParaRPr lang="en-US"/>
           </a:p>
@@ -1614,7 +2169,7 @@
           <a:p>
             <a:fld id="{261B4C4F-285E-6C44-A171-ECB61C3B6F37}" type="datetimeFigureOut">
               <a:rPr lang="en-US" smtClean="0"/>
-              <a:t>11/25/17</a:t>
+              <a:t>11/27/17</a:t>
             </a:fld>
             <a:endParaRPr lang="en-US"/>
           </a:p>
@@ -1732,7 +2287,7 @@
           <a:p>
             <a:fld id="{261B4C4F-285E-6C44-A171-ECB61C3B6F37}" type="datetimeFigureOut">
               <a:rPr lang="en-US" smtClean="0"/>
-              <a:t>11/25/17</a:t>
+              <a:t>11/27/17</a:t>
             </a:fld>
             <a:endParaRPr lang="en-US"/>
           </a:p>
@@ -1827,7 +2382,7 @@
           <a:p>
             <a:fld id="{261B4C4F-285E-6C44-A171-ECB61C3B6F37}" type="datetimeFigureOut">
               <a:rPr lang="en-US" smtClean="0"/>
-              <a:t>11/25/17</a:t>
+              <a:t>11/27/17</a:t>
             </a:fld>
             <a:endParaRPr lang="en-US"/>
           </a:p>
@@ -2104,7 +2659,7 @@
           <a:p>
             <a:fld id="{261B4C4F-285E-6C44-A171-ECB61C3B6F37}" type="datetimeFigureOut">
               <a:rPr lang="en-US" smtClean="0"/>
-              <a:t>11/25/17</a:t>
+              <a:t>11/27/17</a:t>
             </a:fld>
             <a:endParaRPr lang="en-US"/>
           </a:p>
@@ -2357,7 +2912,7 @@
           <a:p>
             <a:fld id="{261B4C4F-285E-6C44-A171-ECB61C3B6F37}" type="datetimeFigureOut">
               <a:rPr lang="en-US" smtClean="0"/>
-              <a:t>11/25/17</a:t>
+              <a:t>11/27/17</a:t>
             </a:fld>
             <a:endParaRPr lang="en-US"/>
           </a:p>
@@ -2570,7 +3125,7 @@
           <a:p>
             <a:fld id="{261B4C4F-285E-6C44-A171-ECB61C3B6F37}" type="datetimeFigureOut">
               <a:rPr lang="en-US" smtClean="0"/>
-              <a:t>11/25/17</a:t>
+              <a:t>11/27/17</a:t>
             </a:fld>
             <a:endParaRPr lang="en-US"/>
           </a:p>
@@ -2748,6 +3303,13 @@
     <p:sldLayoutId id="2147483658" r:id="rId10"/>
     <p:sldLayoutId id="2147483659" r:id="rId11"/>
   </p:sldLayoutIdLst>
+  <p:timing>
+    <p:tnLst>
+      <p:par>
+        <p:cTn id="1" dur="indefinite" restart="never" nodeType="tmRoot"/>
+      </p:par>
+    </p:tnLst>
+  </p:timing>
   <p:txStyles>
     <p:titleStyle>
       <a:lvl1pPr algn="l" defTabSz="914400" rtl="0" eaLnBrk="1" latinLnBrk="0" hangingPunct="1">
@@ -3104,6 +3666,73 @@
   <p:clrMapOvr>
     <a:masterClrMapping/>
   </p:clrMapOvr>
+  <p:timing>
+    <p:tnLst>
+      <p:par>
+        <p:cTn id="1" dur="indefinite" restart="never" nodeType="tmRoot"/>
+      </p:par>
+    </p:tnLst>
+  </p:timing>
+</p:sld>
+</file>
+
+<file path=ppt/slides/slide10.xml><?xml version="1.0" encoding="utf-8"?>
+<p:sld xmlns:a="http://schemas.openxmlformats.org/drawingml/2006/main" xmlns:r="http://schemas.openxmlformats.org/officeDocument/2006/relationships" xmlns:p="http://schemas.openxmlformats.org/presentationml/2006/main">
+  <p:cSld>
+    <p:spTree>
+      <p:nvGrpSpPr>
+        <p:cNvPr id="1" name=""/>
+        <p:cNvGrpSpPr/>
+        <p:nvPr/>
+      </p:nvGrpSpPr>
+      <p:grpSpPr>
+        <a:xfrm>
+          <a:off x="0" y="0"/>
+          <a:ext cx="0" cy="0"/>
+          <a:chOff x="0" y="0"/>
+          <a:chExt cx="0" cy="0"/>
+        </a:xfrm>
+      </p:grpSpPr>
+      <p:sp>
+        <p:nvSpPr>
+          <p:cNvPr id="2" name="Title 1"/>
+          <p:cNvSpPr>
+            <a:spLocks noGrp="1"/>
+          </p:cNvSpPr>
+          <p:nvPr>
+            <p:ph type="ctrTitle"/>
+          </p:nvPr>
+        </p:nvSpPr>
+        <p:spPr/>
+        <p:txBody>
+          <a:bodyPr/>
+          <a:lstStyle/>
+          <a:p>
+            <a:r>
+              <a:rPr lang="en-US" dirty="0" smtClean="0"/>
+              <a:t>Questions?</a:t>
+            </a:r>
+            <a:endParaRPr lang="en-US" dirty="0"/>
+          </a:p>
+        </p:txBody>
+      </p:sp>
+    </p:spTree>
+    <p:extLst>
+      <p:ext uri="{BB962C8B-B14F-4D97-AF65-F5344CB8AC3E}">
+        <p14:creationId xmlns:p14="http://schemas.microsoft.com/office/powerpoint/2010/main" val="583016437"/>
+      </p:ext>
+    </p:extLst>
+  </p:cSld>
+  <p:clrMapOvr>
+    <a:masterClrMapping/>
+  </p:clrMapOvr>
+  <p:timing>
+    <p:tnLst>
+      <p:par>
+        <p:cTn id="1" dur="indefinite" restart="never" nodeType="tmRoot"/>
+      </p:par>
+    </p:tnLst>
+  </p:timing>
 </p:sld>
 </file>
 
@@ -3162,7 +3791,33 @@
           <a:bodyPr/>
           <a:lstStyle/>
           <a:p>
-            <a:endParaRPr lang="en-US"/>
+            <a:r>
+              <a:rPr lang="en-US" dirty="0" smtClean="0"/>
+              <a:t>Red Hat is built on the Linux Kernel.</a:t>
+            </a:r>
+          </a:p>
+          <a:p>
+            <a:r>
+              <a:rPr lang="en-US" dirty="0"/>
+              <a:t>A</a:t>
+            </a:r>
+            <a:r>
+              <a:rPr lang="en-US" dirty="0" smtClean="0"/>
+              <a:t>ims to bring Linux to an enterprise environment</a:t>
+            </a:r>
+          </a:p>
+          <a:p>
+            <a:r>
+              <a:rPr lang="en-US" dirty="0" smtClean="0"/>
+              <a:t>Compatible with Microsoft products such as Windows Server</a:t>
+            </a:r>
+          </a:p>
+          <a:p>
+            <a:r>
+              <a:rPr lang="en-US" dirty="0" smtClean="0"/>
+              <a:t>Design goals include Reliability, Availability, Scalability, and Manageability (RASM)</a:t>
+            </a:r>
+            <a:endParaRPr lang="en-US" dirty="0"/>
           </a:p>
         </p:txBody>
       </p:sp>
@@ -3176,6 +3831,13 @@
   <p:clrMapOvr>
     <a:masterClrMapping/>
   </p:clrMapOvr>
+  <p:timing>
+    <p:tnLst>
+      <p:par>
+        <p:cTn id="1" dur="indefinite" restart="never" nodeType="tmRoot"/>
+      </p:par>
+    </p:tnLst>
+  </p:timing>
 </p:sld>
 </file>
 
@@ -3248,6 +3910,13 @@
   <p:clrMapOvr>
     <a:masterClrMapping/>
   </p:clrMapOvr>
+  <p:timing>
+    <p:tnLst>
+      <p:par>
+        <p:cTn id="1" dur="indefinite" restart="never" nodeType="tmRoot"/>
+      </p:par>
+    </p:tnLst>
+  </p:timing>
 </p:sld>
 </file>
 
@@ -3280,12 +3949,14 @@
         </p:nvSpPr>
         <p:spPr/>
         <p:txBody>
-          <a:bodyPr/>
+          <a:bodyPr>
+            <a:normAutofit/>
+          </a:bodyPr>
           <a:lstStyle/>
           <a:p>
             <a:r>
               <a:rPr lang="en-US" dirty="0" smtClean="0"/>
-              <a:t>Process Scheduling</a:t>
+              <a:t>Our Implementation: Paging</a:t>
             </a:r>
             <a:endParaRPr lang="en-US" dirty="0"/>
           </a:p>
@@ -3313,13 +3984,20 @@
     </p:spTree>
     <p:extLst>
       <p:ext uri="{BB962C8B-B14F-4D97-AF65-F5344CB8AC3E}">
-        <p14:creationId xmlns:p14="http://schemas.microsoft.com/office/powerpoint/2010/main" val="1975939034"/>
+        <p14:creationId xmlns:p14="http://schemas.microsoft.com/office/powerpoint/2010/main" val="1925420096"/>
       </p:ext>
     </p:extLst>
   </p:cSld>
   <p:clrMapOvr>
     <a:masterClrMapping/>
   </p:clrMapOvr>
+  <p:timing>
+    <p:tnLst>
+      <p:par>
+        <p:cTn id="1" dur="indefinite" restart="never" nodeType="tmRoot"/>
+      </p:par>
+    </p:tnLst>
+  </p:timing>
 </p:sld>
 </file>
 
@@ -3357,7 +4035,7 @@
           <a:p>
             <a:r>
               <a:rPr lang="en-US" dirty="0" smtClean="0"/>
-              <a:t>Process Synchronization</a:t>
+              <a:t>Process Scheduling</a:t>
             </a:r>
             <a:endParaRPr lang="en-US" dirty="0"/>
           </a:p>
@@ -3378,20 +4056,97 @@
           <a:bodyPr/>
           <a:lstStyle/>
           <a:p>
-            <a:endParaRPr lang="en-US"/>
+            <a:r>
+              <a:rPr lang="en-US" dirty="0" smtClean="0"/>
+              <a:t>Real time policies: </a:t>
+            </a:r>
+            <a:r>
+              <a:rPr lang="en-US" dirty="0" smtClean="0">
+                <a:latin typeface="Courier New" charset="0"/>
+                <a:ea typeface="Courier New" charset="0"/>
+                <a:cs typeface="Courier New" charset="0"/>
+              </a:rPr>
+              <a:t>SCHED_FIFO, SCHED_RR</a:t>
+            </a:r>
+          </a:p>
+          <a:p>
+            <a:pPr lvl="1"/>
+            <a:r>
+              <a:rPr lang="en-US" sz="3200" dirty="0"/>
+              <a:t>Used for time sensitive, atomic </a:t>
+            </a:r>
+            <a:r>
+              <a:rPr lang="en-US" sz="3200" dirty="0" smtClean="0"/>
+              <a:t>tasks</a:t>
+            </a:r>
+          </a:p>
+          <a:p>
+            <a:pPr lvl="1"/>
+            <a:r>
+              <a:rPr lang="en-US" sz="3200" dirty="0" smtClean="0"/>
+              <a:t>Higher priority than normal jobs</a:t>
+            </a:r>
+            <a:endParaRPr lang="en-US" sz="3200" dirty="0"/>
+          </a:p>
+          <a:p>
+            <a:r>
+              <a:rPr lang="en-US" dirty="0" smtClean="0"/>
+              <a:t>Normal policies: </a:t>
+            </a:r>
+            <a:r>
+              <a:rPr lang="en-US" dirty="0" smtClean="0">
+                <a:latin typeface="Courier New" charset="0"/>
+                <a:ea typeface="Courier New" charset="0"/>
+                <a:cs typeface="Courier New" charset="0"/>
+              </a:rPr>
+              <a:t>SCHED_OTHER, SCHED_BATCH, SCHED_IDLE</a:t>
+            </a:r>
+          </a:p>
+          <a:p>
+            <a:pPr lvl="1"/>
+            <a:r>
+              <a:rPr lang="en-US" sz="3200" dirty="0" smtClean="0"/>
+              <a:t>Jobs have less interest in performance tuning</a:t>
+            </a:r>
+          </a:p>
+          <a:p>
+            <a:pPr lvl="1"/>
+            <a:r>
+              <a:rPr lang="en-US" sz="3200" dirty="0" smtClean="0"/>
+              <a:t>Better </a:t>
+            </a:r>
+            <a:r>
+              <a:rPr lang="en-US" sz="3200" dirty="0"/>
+              <a:t>throughput because of less </a:t>
+            </a:r>
+            <a:r>
+              <a:rPr lang="en-US" sz="3200" dirty="0" smtClean="0"/>
+              <a:t>preemption</a:t>
+            </a:r>
+          </a:p>
+          <a:p>
+            <a:pPr lvl="1"/>
+            <a:endParaRPr lang="en-US" sz="3200" dirty="0"/>
           </a:p>
         </p:txBody>
       </p:sp>
     </p:spTree>
     <p:extLst>
       <p:ext uri="{BB962C8B-B14F-4D97-AF65-F5344CB8AC3E}">
-        <p14:creationId xmlns:p14="http://schemas.microsoft.com/office/powerpoint/2010/main" val="688804295"/>
+        <p14:creationId xmlns:p14="http://schemas.microsoft.com/office/powerpoint/2010/main" val="1975939034"/>
       </p:ext>
     </p:extLst>
   </p:cSld>
   <p:clrMapOvr>
     <a:masterClrMapping/>
   </p:clrMapOvr>
+  <p:timing>
+    <p:tnLst>
+      <p:par>
+        <p:cTn id="1" dur="indefinite" restart="never" nodeType="tmRoot"/>
+      </p:par>
+    </p:tnLst>
+  </p:timing>
 </p:sld>
 </file>
 
@@ -3424,57 +4179,83 @@
         </p:nvSpPr>
         <p:spPr/>
         <p:txBody>
-          <a:bodyPr/>
+          <a:bodyPr>
+            <a:normAutofit/>
+          </a:bodyPr>
           <a:lstStyle/>
           <a:p>
             <a:r>
               <a:rPr lang="en-US" dirty="0" smtClean="0"/>
-              <a:t>Sources</a:t>
+              <a:t>Our Implementation: </a:t>
+            </a:r>
+            <a:r>
+              <a:rPr lang="en-US" dirty="0" smtClean="0">
+                <a:latin typeface="Courier New" charset="0"/>
+                <a:ea typeface="Courier New" charset="0"/>
+                <a:cs typeface="Courier New" charset="0"/>
+              </a:rPr>
+              <a:t>SCHED_OTHER</a:t>
+            </a:r>
+            <a:endParaRPr lang="en-US" dirty="0">
+              <a:latin typeface="Courier New" charset="0"/>
+              <a:ea typeface="Courier New" charset="0"/>
+              <a:cs typeface="Courier New" charset="0"/>
+            </a:endParaRPr>
+          </a:p>
+        </p:txBody>
+      </p:sp>
+      <p:sp>
+        <p:nvSpPr>
+          <p:cNvPr id="3" name="Content Placeholder 2"/>
+          <p:cNvSpPr>
+            <a:spLocks noGrp="1"/>
+          </p:cNvSpPr>
+          <p:nvPr>
+            <p:ph idx="1"/>
+          </p:nvPr>
+        </p:nvSpPr>
+        <p:spPr/>
+        <p:txBody>
+          <a:bodyPr/>
+          <a:lstStyle/>
+          <a:p>
+            <a:r>
+              <a:rPr lang="en-US" dirty="0" smtClean="0"/>
+              <a:t>Uses the Completely Fair Scheduler</a:t>
+            </a:r>
+          </a:p>
+          <a:p>
+            <a:r>
+              <a:rPr lang="en-US" dirty="0" smtClean="0"/>
+              <a:t>The less time a process has been permitted to access the processor, the more it needs to access the processor.</a:t>
+            </a:r>
+          </a:p>
+          <a:p>
+            <a:r>
+              <a:rPr lang="en-US" dirty="0" smtClean="0"/>
+              <a:t>Organizes processes in a red-black tree</a:t>
             </a:r>
             <a:endParaRPr lang="en-US" dirty="0"/>
-          </a:p>
-        </p:txBody>
-      </p:sp>
-      <p:sp>
-        <p:nvSpPr>
-          <p:cNvPr id="3" name="Content Placeholder 2"/>
-          <p:cNvSpPr>
-            <a:spLocks noGrp="1"/>
-          </p:cNvSpPr>
-          <p:nvPr>
-            <p:ph idx="1"/>
-          </p:nvPr>
-        </p:nvSpPr>
-        <p:spPr/>
-        <p:txBody>
-          <a:bodyPr/>
-          <a:lstStyle/>
-          <a:p>
-            <a:r>
-              <a:rPr lang="en-US" dirty="0"/>
-              <a:t>https://</a:t>
-            </a:r>
-            <a:r>
-              <a:rPr lang="en-US" dirty="0" err="1"/>
-              <a:t>brand.redhat.com</a:t>
-            </a:r>
-            <a:r>
-              <a:rPr lang="en-US" dirty="0"/>
-              <a:t>/</a:t>
-            </a:r>
           </a:p>
         </p:txBody>
       </p:sp>
     </p:spTree>
     <p:extLst>
       <p:ext uri="{BB962C8B-B14F-4D97-AF65-F5344CB8AC3E}">
-        <p14:creationId xmlns:p14="http://schemas.microsoft.com/office/powerpoint/2010/main" val="439456739"/>
+        <p14:creationId xmlns:p14="http://schemas.microsoft.com/office/powerpoint/2010/main" val="104476829"/>
       </p:ext>
     </p:extLst>
   </p:cSld>
   <p:clrMapOvr>
     <a:masterClrMapping/>
   </p:clrMapOvr>
+  <p:timing>
+    <p:tnLst>
+      <p:par>
+        <p:cTn id="1" dur="indefinite" restart="never" nodeType="tmRoot"/>
+      </p:par>
+    </p:tnLst>
+  </p:timing>
 </p:sld>
 </file>
 
@@ -3502,7 +4283,7 @@
             <a:spLocks noGrp="1"/>
           </p:cNvSpPr>
           <p:nvPr>
-            <p:ph type="ctrTitle"/>
+            <p:ph type="title"/>
           </p:nvPr>
         </p:nvSpPr>
         <p:spPr/>
@@ -3512,7 +4293,73 @@
           <a:p>
             <a:r>
               <a:rPr lang="en-US" dirty="0" smtClean="0"/>
-              <a:t>Questions?</a:t>
+              <a:t>Process Synchronization</a:t>
+            </a:r>
+            <a:endParaRPr lang="en-US" dirty="0"/>
+          </a:p>
+        </p:txBody>
+      </p:sp>
+      <p:sp>
+        <p:nvSpPr>
+          <p:cNvPr id="3" name="Content Placeholder 2"/>
+          <p:cNvSpPr>
+            <a:spLocks noGrp="1"/>
+          </p:cNvSpPr>
+          <p:nvPr>
+            <p:ph idx="1"/>
+          </p:nvPr>
+        </p:nvSpPr>
+        <p:spPr/>
+        <p:txBody>
+          <a:bodyPr>
+            <a:normAutofit lnSpcReduction="10000"/>
+          </a:bodyPr>
+          <a:lstStyle/>
+          <a:p>
+            <a:r>
+              <a:rPr lang="en-US" dirty="0" smtClean="0"/>
+              <a:t>Much of Red Hat’s kernel process synchronization come directly from the Linux Kernel.</a:t>
+            </a:r>
+          </a:p>
+          <a:p>
+            <a:r>
+              <a:rPr lang="en-US" dirty="0" smtClean="0"/>
+              <a:t>Normal Critical </a:t>
+            </a:r>
+            <a:r>
+              <a:rPr lang="en-US" dirty="0"/>
+              <a:t>S</a:t>
+            </a:r>
+            <a:r>
+              <a:rPr lang="en-US" dirty="0" smtClean="0"/>
+              <a:t>ections</a:t>
+            </a:r>
+          </a:p>
+          <a:p>
+            <a:pPr lvl="1"/>
+            <a:r>
+              <a:rPr lang="en-US" dirty="0" smtClean="0"/>
+              <a:t>SMP systems us spin locks for short term and semaphores for long term locking.</a:t>
+            </a:r>
+          </a:p>
+          <a:p>
+            <a:pPr lvl="1"/>
+            <a:r>
+              <a:rPr lang="en-US" dirty="0" smtClean="0"/>
+              <a:t>Single processor machines turn preemption on or off</a:t>
+            </a:r>
+          </a:p>
+          <a:p>
+            <a:r>
+              <a:rPr lang="en-US" dirty="0" smtClean="0"/>
+              <a:t>Interrupt Critical Sections</a:t>
+            </a:r>
+          </a:p>
+          <a:p>
+            <a:pPr lvl="1"/>
+            <a:r>
+              <a:rPr lang="en-US" dirty="0" smtClean="0"/>
+              <a:t>Interrupt routines are split into two sections: the top half and the bottom half</a:t>
             </a:r>
             <a:endParaRPr lang="en-US" dirty="0"/>
           </a:p>
@@ -3521,13 +4368,264 @@
     </p:spTree>
     <p:extLst>
       <p:ext uri="{BB962C8B-B14F-4D97-AF65-F5344CB8AC3E}">
-        <p14:creationId xmlns:p14="http://schemas.microsoft.com/office/powerpoint/2010/main" val="583016437"/>
+        <p14:creationId xmlns:p14="http://schemas.microsoft.com/office/powerpoint/2010/main" val="688804295"/>
       </p:ext>
     </p:extLst>
   </p:cSld>
   <p:clrMapOvr>
     <a:masterClrMapping/>
   </p:clrMapOvr>
+  <p:timing>
+    <p:tnLst>
+      <p:par>
+        <p:cTn id="1" dur="indefinite" restart="never" nodeType="tmRoot"/>
+      </p:par>
+    </p:tnLst>
+  </p:timing>
+</p:sld>
+</file>
+
+<file path=ppt/slides/slide8.xml><?xml version="1.0" encoding="utf-8"?>
+<p:sld xmlns:a="http://schemas.openxmlformats.org/drawingml/2006/main" xmlns:r="http://schemas.openxmlformats.org/officeDocument/2006/relationships" xmlns:p="http://schemas.openxmlformats.org/presentationml/2006/main">
+  <p:cSld>
+    <p:spTree>
+      <p:nvGrpSpPr>
+        <p:cNvPr id="1" name=""/>
+        <p:cNvGrpSpPr/>
+        <p:nvPr/>
+      </p:nvGrpSpPr>
+      <p:grpSpPr>
+        <a:xfrm>
+          <a:off x="0" y="0"/>
+          <a:ext cx="0" cy="0"/>
+          <a:chOff x="0" y="0"/>
+          <a:chExt cx="0" cy="0"/>
+        </a:xfrm>
+      </p:grpSpPr>
+      <p:sp>
+        <p:nvSpPr>
+          <p:cNvPr id="2" name="Title 1"/>
+          <p:cNvSpPr>
+            <a:spLocks noGrp="1"/>
+          </p:cNvSpPr>
+          <p:nvPr>
+            <p:ph type="title"/>
+          </p:nvPr>
+        </p:nvSpPr>
+        <p:spPr/>
+        <p:txBody>
+          <a:bodyPr>
+            <a:normAutofit/>
+          </a:bodyPr>
+          <a:lstStyle/>
+          <a:p>
+            <a:r>
+              <a:rPr lang="en-US" dirty="0" smtClean="0"/>
+              <a:t>Our Implementation: Semaphores</a:t>
+            </a:r>
+            <a:endParaRPr lang="en-US" dirty="0"/>
+          </a:p>
+        </p:txBody>
+      </p:sp>
+      <p:sp>
+        <p:nvSpPr>
+          <p:cNvPr id="3" name="Content Placeholder 2"/>
+          <p:cNvSpPr>
+            <a:spLocks noGrp="1"/>
+          </p:cNvSpPr>
+          <p:nvPr>
+            <p:ph idx="1"/>
+          </p:nvPr>
+        </p:nvSpPr>
+        <p:spPr/>
+        <p:txBody>
+          <a:bodyPr>
+            <a:normAutofit/>
+          </a:bodyPr>
+          <a:lstStyle/>
+          <a:p>
+            <a:endParaRPr lang="en-US" dirty="0"/>
+          </a:p>
+        </p:txBody>
+      </p:sp>
+    </p:spTree>
+    <p:extLst>
+      <p:ext uri="{BB962C8B-B14F-4D97-AF65-F5344CB8AC3E}">
+        <p14:creationId xmlns:p14="http://schemas.microsoft.com/office/powerpoint/2010/main" val="1442455708"/>
+      </p:ext>
+    </p:extLst>
+  </p:cSld>
+  <p:clrMapOvr>
+    <a:masterClrMapping/>
+  </p:clrMapOvr>
+  <p:timing>
+    <p:tnLst>
+      <p:par>
+        <p:cTn id="1" dur="indefinite" restart="never" nodeType="tmRoot"/>
+      </p:par>
+    </p:tnLst>
+  </p:timing>
+</p:sld>
+</file>
+
+<file path=ppt/slides/slide9.xml><?xml version="1.0" encoding="utf-8"?>
+<p:sld xmlns:a="http://schemas.openxmlformats.org/drawingml/2006/main" xmlns:r="http://schemas.openxmlformats.org/officeDocument/2006/relationships" xmlns:p="http://schemas.openxmlformats.org/presentationml/2006/main">
+  <p:cSld>
+    <p:spTree>
+      <p:nvGrpSpPr>
+        <p:cNvPr id="1" name=""/>
+        <p:cNvGrpSpPr/>
+        <p:nvPr/>
+      </p:nvGrpSpPr>
+      <p:grpSpPr>
+        <a:xfrm>
+          <a:off x="0" y="0"/>
+          <a:ext cx="0" cy="0"/>
+          <a:chOff x="0" y="0"/>
+          <a:chExt cx="0" cy="0"/>
+        </a:xfrm>
+      </p:grpSpPr>
+      <p:sp>
+        <p:nvSpPr>
+          <p:cNvPr id="2" name="Title 1"/>
+          <p:cNvSpPr>
+            <a:spLocks noGrp="1"/>
+          </p:cNvSpPr>
+          <p:nvPr>
+            <p:ph type="title"/>
+          </p:nvPr>
+        </p:nvSpPr>
+        <p:spPr/>
+        <p:txBody>
+          <a:bodyPr/>
+          <a:lstStyle/>
+          <a:p>
+            <a:r>
+              <a:rPr lang="en-US" dirty="0" smtClean="0"/>
+              <a:t>Sources</a:t>
+            </a:r>
+            <a:endParaRPr lang="en-US" dirty="0"/>
+          </a:p>
+        </p:txBody>
+      </p:sp>
+      <p:sp>
+        <p:nvSpPr>
+          <p:cNvPr id="3" name="Content Placeholder 2"/>
+          <p:cNvSpPr>
+            <a:spLocks noGrp="1"/>
+          </p:cNvSpPr>
+          <p:nvPr>
+            <p:ph idx="1"/>
+          </p:nvPr>
+        </p:nvSpPr>
+        <p:spPr/>
+        <p:txBody>
+          <a:bodyPr/>
+          <a:lstStyle/>
+          <a:p>
+            <a:r>
+              <a:rPr lang="en-US" dirty="0" smtClean="0">
+                <a:hlinkClick r:id="rId2"/>
+              </a:rPr>
+              <a:t>IBM </a:t>
+            </a:r>
+            <a:r>
+              <a:rPr lang="en-US" dirty="0">
+                <a:hlinkClick r:id="rId2"/>
+              </a:rPr>
+              <a:t>d</a:t>
+            </a:r>
+            <a:r>
+              <a:rPr lang="en-US" dirty="0" smtClean="0">
+                <a:hlinkClick r:id="rId2"/>
+              </a:rPr>
+              <a:t>eveloperWorks</a:t>
+            </a:r>
+            <a:endParaRPr lang="en-US" dirty="0">
+              <a:hlinkClick r:id="rId3"/>
+            </a:endParaRPr>
+          </a:p>
+          <a:p>
+            <a:r>
+              <a:rPr lang="en-US" dirty="0" smtClean="0">
+                <a:hlinkClick r:id="rId3"/>
+              </a:rPr>
+              <a:t>Linux Kernel</a:t>
+            </a:r>
+            <a:endParaRPr lang="en-US" dirty="0" smtClean="0"/>
+          </a:p>
+          <a:p>
+            <a:r>
+              <a:rPr lang="en-US" dirty="0">
+                <a:hlinkClick r:id="rId4"/>
+              </a:rPr>
+              <a:t>Network </a:t>
+            </a:r>
+            <a:r>
+              <a:rPr lang="en-US" dirty="0" smtClean="0">
+                <a:hlinkClick r:id="rId4"/>
+              </a:rPr>
+              <a:t>World</a:t>
+            </a:r>
+            <a:endParaRPr lang="en-US" dirty="0">
+              <a:hlinkClick r:id="rId3"/>
+            </a:endParaRPr>
+          </a:p>
+          <a:p>
+            <a:r>
+              <a:rPr lang="en-US" dirty="0" smtClean="0">
+                <a:hlinkClick r:id="rId5"/>
+              </a:rPr>
+              <a:t>Operating Systems Concepts </a:t>
+            </a:r>
+            <a:endParaRPr lang="en-US" dirty="0" smtClean="0"/>
+          </a:p>
+          <a:p>
+            <a:r>
+              <a:rPr lang="en-US" dirty="0" smtClean="0">
+                <a:hlinkClick r:id="rId3"/>
+              </a:rPr>
+              <a:t>Red </a:t>
+            </a:r>
+            <a:r>
+              <a:rPr lang="en-US" dirty="0">
+                <a:hlinkClick r:id="rId3"/>
+              </a:rPr>
+              <a:t>Hat Branding</a:t>
+            </a:r>
+            <a:endParaRPr lang="en-US" dirty="0"/>
+          </a:p>
+          <a:p>
+            <a:r>
+              <a:rPr lang="en-US" dirty="0">
+                <a:hlinkClick r:id="rId6"/>
+              </a:rPr>
+              <a:t>Red Hat Website</a:t>
+            </a:r>
+            <a:endParaRPr lang="en-US" dirty="0"/>
+          </a:p>
+          <a:p>
+            <a:endParaRPr lang="en-US" dirty="0"/>
+          </a:p>
+        </p:txBody>
+      </p:sp>
+    </p:spTree>
+    <p:extLst>
+      <p:ext uri="{BB962C8B-B14F-4D97-AF65-F5344CB8AC3E}">
+        <p14:creationId xmlns:p14="http://schemas.microsoft.com/office/powerpoint/2010/main" val="439456739"/>
+      </p:ext>
+    </p:extLst>
+  </p:cSld>
+  <p:clrMapOvr>
+    <a:masterClrMapping/>
+  </p:clrMapOvr>
+  <p:timing>
+    <p:tnLst>
+      <p:par>
+        <p:cTn id="1" dur="indefinite" restart="never" nodeType="tmRoot"/>
+      </p:par>
+    </p:tnLst>
+  </p:timing>
 </p:sld>
 </file>
 
@@ -3790,4 +4888,265 @@
     </a:ext>
   </a:extLst>
 </a:theme>
+</file>
+
+<file path=ppt/theme/theme2.xml><?xml version="1.0" encoding="utf-8"?>
+<a:theme xmlns:a="http://schemas.openxmlformats.org/drawingml/2006/main" name="Office Theme">
+  <a:themeElements>
+    <a:clrScheme name="Office">
+      <a:dk1>
+        <a:sysClr val="windowText" lastClr="000000"/>
+      </a:dk1>
+      <a:lt1>
+        <a:sysClr val="window" lastClr="FFFFFF"/>
+      </a:lt1>
+      <a:dk2>
+        <a:srgbClr val="44546A"/>
+      </a:dk2>
+      <a:lt2>
+        <a:srgbClr val="E7E6E6"/>
+      </a:lt2>
+      <a:accent1>
+        <a:srgbClr val="4472C4"/>
+      </a:accent1>
+      <a:accent2>
+        <a:srgbClr val="ED7D31"/>
+      </a:accent2>
+      <a:accent3>
+        <a:srgbClr val="A5A5A5"/>
+      </a:accent3>
+      <a:accent4>
+        <a:srgbClr val="FFC000"/>
+      </a:accent4>
+      <a:accent5>
+        <a:srgbClr val="5B9BD5"/>
+      </a:accent5>
+      <a:accent6>
+        <a:srgbClr val="70AD47"/>
+      </a:accent6>
+      <a:hlink>
+        <a:srgbClr val="0563C1"/>
+      </a:hlink>
+      <a:folHlink>
+        <a:srgbClr val="954F72"/>
+      </a:folHlink>
+    </a:clrScheme>
+    <a:fontScheme name="Office">
+      <a:majorFont>
+        <a:latin typeface="Calibri Light" panose="020F0302020204030204"/>
+        <a:ea typeface=""/>
+        <a:cs typeface=""/>
+        <a:font script="Jpan" typeface="Yu Gothic Light"/>
+        <a:font script="Hang" typeface="맑은 고딕"/>
+        <a:font script="Hans" typeface="DengXian Light"/>
+        <a:font script="Hant" typeface="新細明體"/>
+        <a:font script="Arab" typeface="Times New Roman"/>
+        <a:font script="Hebr" typeface="Times New Roman"/>
+        <a:font script="Thai" typeface="Angsana New"/>
+        <a:font script="Ethi" typeface="Nyala"/>
+        <a:font script="Beng" typeface="Vrinda"/>
+        <a:font script="Gujr" typeface="Shruti"/>
+        <a:font script="Khmr" typeface="MoolBoran"/>
+        <a:font script="Knda" typeface="Tunga"/>
+        <a:font script="Guru" typeface="Raavi"/>
+        <a:font script="Cans" typeface="Euphemia"/>
+        <a:font script="Cher" typeface="Plantagenet Cherokee"/>
+        <a:font script="Yiii" typeface="Microsoft Yi Baiti"/>
+        <a:font script="Tibt" typeface="Microsoft Himalaya"/>
+        <a:font script="Thaa" typeface="MV Boli"/>
+        <a:font script="Deva" typeface="Mangal"/>
+        <a:font script="Telu" typeface="Gautami"/>
+        <a:font script="Taml" typeface="Latha"/>
+        <a:font script="Syrc" typeface="Estrangelo Edessa"/>
+        <a:font script="Orya" typeface="Kalinga"/>
+        <a:font script="Mlym" typeface="Kartika"/>
+        <a:font script="Laoo" typeface="DokChampa"/>
+        <a:font script="Sinh" typeface="Iskoola Pota"/>
+        <a:font script="Mong" typeface="Mongolian Baiti"/>
+        <a:font script="Viet" typeface="Times New Roman"/>
+        <a:font script="Uigh" typeface="Microsoft Uighur"/>
+        <a:font script="Geor" typeface="Sylfaen"/>
+      </a:majorFont>
+      <a:minorFont>
+        <a:latin typeface="Calibri" panose="020F0502020204030204"/>
+        <a:ea typeface=""/>
+        <a:cs typeface=""/>
+        <a:font script="Jpan" typeface="Yu Gothic"/>
+        <a:font script="Hang" typeface="맑은 고딕"/>
+        <a:font script="Hans" typeface="DengXian"/>
+        <a:font script="Hant" typeface="新細明體"/>
+        <a:font script="Arab" typeface="Arial"/>
+        <a:font script="Hebr" typeface="Arial"/>
+        <a:font script="Thai" typeface="Cordia New"/>
+        <a:font script="Ethi" typeface="Nyala"/>
+        <a:font script="Beng" typeface="Vrinda"/>
+        <a:font script="Gujr" typeface="Shruti"/>
+        <a:font script="Khmr" typeface="DaunPenh"/>
+        <a:font script="Knda" typeface="Tunga"/>
+        <a:font script="Guru" typeface="Raavi"/>
+        <a:font script="Cans" typeface="Euphemia"/>
+        <a:font script="Cher" typeface="Plantagenet Cherokee"/>
+        <a:font script="Yiii" typeface="Microsoft Yi Baiti"/>
+        <a:font script="Tibt" typeface="Microsoft Himalaya"/>
+        <a:font script="Thaa" typeface="MV Boli"/>
+        <a:font script="Deva" typeface="Mangal"/>
+        <a:font script="Telu" typeface="Gautami"/>
+        <a:font script="Taml" typeface="Latha"/>
+        <a:font script="Syrc" typeface="Estrangelo Edessa"/>
+        <a:font script="Orya" typeface="Kalinga"/>
+        <a:font script="Mlym" typeface="Kartika"/>
+        <a:font script="Laoo" typeface="DokChampa"/>
+        <a:font script="Sinh" typeface="Iskoola Pota"/>
+        <a:font script="Mong" typeface="Mongolian Baiti"/>
+        <a:font script="Viet" typeface="Arial"/>
+        <a:font script="Uigh" typeface="Microsoft Uighur"/>
+        <a:font script="Geor" typeface="Sylfaen"/>
+      </a:minorFont>
+    </a:fontScheme>
+    <a:fmtScheme name="Office">
+      <a:fillStyleLst>
+        <a:solidFill>
+          <a:schemeClr val="phClr"/>
+        </a:solidFill>
+        <a:gradFill rotWithShape="1">
+          <a:gsLst>
+            <a:gs pos="0">
+              <a:schemeClr val="phClr">
+                <a:lumMod val="110000"/>
+                <a:satMod val="105000"/>
+                <a:tint val="67000"/>
+              </a:schemeClr>
+            </a:gs>
+            <a:gs pos="50000">
+              <a:schemeClr val="phClr">
+                <a:lumMod val="105000"/>
+                <a:satMod val="103000"/>
+                <a:tint val="73000"/>
+              </a:schemeClr>
+            </a:gs>
+            <a:gs pos="100000">
+              <a:schemeClr val="phClr">
+                <a:lumMod val="105000"/>
+                <a:satMod val="109000"/>
+                <a:tint val="81000"/>
+              </a:schemeClr>
+            </a:gs>
+          </a:gsLst>
+          <a:lin ang="5400000" scaled="0"/>
+        </a:gradFill>
+        <a:gradFill rotWithShape="1">
+          <a:gsLst>
+            <a:gs pos="0">
+              <a:schemeClr val="phClr">
+                <a:satMod val="103000"/>
+                <a:lumMod val="102000"/>
+                <a:tint val="94000"/>
+              </a:schemeClr>
+            </a:gs>
+            <a:gs pos="50000">
+              <a:schemeClr val="phClr">
+                <a:satMod val="110000"/>
+                <a:lumMod val="100000"/>
+                <a:shade val="100000"/>
+              </a:schemeClr>
+            </a:gs>
+            <a:gs pos="100000">
+              <a:schemeClr val="phClr">
+                <a:lumMod val="99000"/>
+                <a:satMod val="120000"/>
+                <a:shade val="78000"/>
+              </a:schemeClr>
+            </a:gs>
+          </a:gsLst>
+          <a:lin ang="5400000" scaled="0"/>
+        </a:gradFill>
+      </a:fillStyleLst>
+      <a:lnStyleLst>
+        <a:ln w="6350" cap="flat" cmpd="sng" algn="ctr">
+          <a:solidFill>
+            <a:schemeClr val="phClr"/>
+          </a:solidFill>
+          <a:prstDash val="solid"/>
+          <a:miter lim="800000"/>
+        </a:ln>
+        <a:ln w="12700" cap="flat" cmpd="sng" algn="ctr">
+          <a:solidFill>
+            <a:schemeClr val="phClr"/>
+          </a:solidFill>
+          <a:prstDash val="solid"/>
+          <a:miter lim="800000"/>
+        </a:ln>
+        <a:ln w="19050" cap="flat" cmpd="sng" algn="ctr">
+          <a:solidFill>
+            <a:schemeClr val="phClr"/>
+          </a:solidFill>
+          <a:prstDash val="solid"/>
+          <a:miter lim="800000"/>
+        </a:ln>
+      </a:lnStyleLst>
+      <a:effectStyleLst>
+        <a:effectStyle>
+          <a:effectLst/>
+        </a:effectStyle>
+        <a:effectStyle>
+          <a:effectLst/>
+        </a:effectStyle>
+        <a:effectStyle>
+          <a:effectLst>
+            <a:outerShdw blurRad="57150" dist="19050" dir="5400000" algn="ctr" rotWithShape="0">
+              <a:srgbClr val="000000">
+                <a:alpha val="63000"/>
+              </a:srgbClr>
+            </a:outerShdw>
+          </a:effectLst>
+        </a:effectStyle>
+      </a:effectStyleLst>
+      <a:bgFillStyleLst>
+        <a:solidFill>
+          <a:schemeClr val="phClr"/>
+        </a:solidFill>
+        <a:solidFill>
+          <a:schemeClr val="phClr">
+            <a:tint val="95000"/>
+            <a:satMod val="170000"/>
+          </a:schemeClr>
+        </a:solidFill>
+        <a:gradFill rotWithShape="1">
+          <a:gsLst>
+            <a:gs pos="0">
+              <a:schemeClr val="phClr">
+                <a:tint val="93000"/>
+                <a:satMod val="150000"/>
+                <a:shade val="98000"/>
+                <a:lumMod val="102000"/>
+              </a:schemeClr>
+            </a:gs>
+            <a:gs pos="50000">
+              <a:schemeClr val="phClr">
+                <a:tint val="98000"/>
+                <a:satMod val="130000"/>
+                <a:shade val="90000"/>
+                <a:lumMod val="103000"/>
+              </a:schemeClr>
+            </a:gs>
+            <a:gs pos="100000">
+              <a:schemeClr val="phClr">
+                <a:shade val="63000"/>
+                <a:satMod val="120000"/>
+              </a:schemeClr>
+            </a:gs>
+          </a:gsLst>
+          <a:lin ang="5400000" scaled="0"/>
+        </a:gradFill>
+      </a:bgFillStyleLst>
+    </a:fmtScheme>
+  </a:themeElements>
+  <a:objectDefaults/>
+  <a:extraClrSchemeLst/>
+  <a:extLst>
+    <a:ext uri="{05A4C25C-085E-4340-85A3-A5531E510DB2}">
+      <thm15:themeFamily xmlns:thm15="http://schemas.microsoft.com/office/thememl/2012/main" name="Office Theme" id="{62F939B6-93AF-4DB8-9C6B-D6C7DFDC589F}" vid="{4A3C46E8-61CC-4603-A589-7422A47A8E4A}"/>
+    </a:ext>
+  </a:extLst>
+</a:theme>
 </file>
</xml_diff>

<commit_message>
Added memory mangement background to presentation.
</commit_message>
<xml_diff>
--- a/reports/RedHat_Presentation.pptx
+++ b/reports/RedHat_Presentation.pptx
@@ -120,6 +120,9 @@
     <p:ext uri="{EFAFB233-063F-42B5-8137-9DF3F51BA10A}">
       <p15:sldGuideLst xmlns:p15="http://schemas.microsoft.com/office/powerpoint/2012/main"/>
     </p:ext>
+    <p:ext uri="{2D200454-40CA-4A62-9FC3-DE9A4176ACB9}">
+      <p15:notesGuideLst xmlns:p15="http://schemas.microsoft.com/office/powerpoint/2012/main"/>
+    </p:ext>
   </p:extLst>
 </p:presentation>
 </file>
@@ -206,7 +209,7 @@
           <a:p>
             <a:fld id="{69409E05-1A56-D54D-A345-64CF5FB8EAC1}" type="datetimeFigureOut">
               <a:rPr lang="en-US" smtClean="0"/>
-              <a:t>11/27/17</a:t>
+              <a:t>11/28/17</a:t>
             </a:fld>
             <a:endParaRPr lang="en-US"/>
           </a:p>
@@ -773,7 +776,7 @@
           <a:p>
             <a:fld id="{261B4C4F-285E-6C44-A171-ECB61C3B6F37}" type="datetimeFigureOut">
               <a:rPr lang="en-US" smtClean="0"/>
-              <a:t>11/27/17</a:t>
+              <a:t>11/28/17</a:t>
             </a:fld>
             <a:endParaRPr lang="en-US"/>
           </a:p>
@@ -943,7 +946,7 @@
           <a:p>
             <a:fld id="{261B4C4F-285E-6C44-A171-ECB61C3B6F37}" type="datetimeFigureOut">
               <a:rPr lang="en-US" smtClean="0"/>
-              <a:t>11/27/17</a:t>
+              <a:t>11/28/17</a:t>
             </a:fld>
             <a:endParaRPr lang="en-US"/>
           </a:p>
@@ -1123,7 +1126,7 @@
           <a:p>
             <a:fld id="{261B4C4F-285E-6C44-A171-ECB61C3B6F37}" type="datetimeFigureOut">
               <a:rPr lang="en-US" smtClean="0"/>
-              <a:t>11/27/17</a:t>
+              <a:t>11/28/17</a:t>
             </a:fld>
             <a:endParaRPr lang="en-US"/>
           </a:p>
@@ -1317,7 +1320,7 @@
           <a:p>
             <a:fld id="{261B4C4F-285E-6C44-A171-ECB61C3B6F37}" type="datetimeFigureOut">
               <a:rPr lang="en-US" smtClean="0"/>
-              <a:t>11/27/17</a:t>
+              <a:t>11/28/17</a:t>
             </a:fld>
             <a:endParaRPr lang="en-US"/>
           </a:p>
@@ -1570,7 +1573,7 @@
           <a:p>
             <a:fld id="{261B4C4F-285E-6C44-A171-ECB61C3B6F37}" type="datetimeFigureOut">
               <a:rPr lang="en-US" smtClean="0"/>
-              <a:t>11/27/17</a:t>
+              <a:t>11/28/17</a:t>
             </a:fld>
             <a:endParaRPr lang="en-US"/>
           </a:p>
@@ -1802,7 +1805,7 @@
           <a:p>
             <a:fld id="{261B4C4F-285E-6C44-A171-ECB61C3B6F37}" type="datetimeFigureOut">
               <a:rPr lang="en-US" smtClean="0"/>
-              <a:t>11/27/17</a:t>
+              <a:t>11/28/17</a:t>
             </a:fld>
             <a:endParaRPr lang="en-US"/>
           </a:p>
@@ -2169,7 +2172,7 @@
           <a:p>
             <a:fld id="{261B4C4F-285E-6C44-A171-ECB61C3B6F37}" type="datetimeFigureOut">
               <a:rPr lang="en-US" smtClean="0"/>
-              <a:t>11/27/17</a:t>
+              <a:t>11/28/17</a:t>
             </a:fld>
             <a:endParaRPr lang="en-US"/>
           </a:p>
@@ -2287,7 +2290,7 @@
           <a:p>
             <a:fld id="{261B4C4F-285E-6C44-A171-ECB61C3B6F37}" type="datetimeFigureOut">
               <a:rPr lang="en-US" smtClean="0"/>
-              <a:t>11/27/17</a:t>
+              <a:t>11/28/17</a:t>
             </a:fld>
             <a:endParaRPr lang="en-US"/>
           </a:p>
@@ -2382,7 +2385,7 @@
           <a:p>
             <a:fld id="{261B4C4F-285E-6C44-A171-ECB61C3B6F37}" type="datetimeFigureOut">
               <a:rPr lang="en-US" smtClean="0"/>
-              <a:t>11/27/17</a:t>
+              <a:t>11/28/17</a:t>
             </a:fld>
             <a:endParaRPr lang="en-US"/>
           </a:p>
@@ -2659,7 +2662,7 @@
           <a:p>
             <a:fld id="{261B4C4F-285E-6C44-A171-ECB61C3B6F37}" type="datetimeFigureOut">
               <a:rPr lang="en-US" smtClean="0"/>
-              <a:t>11/27/17</a:t>
+              <a:t>11/28/17</a:t>
             </a:fld>
             <a:endParaRPr lang="en-US"/>
           </a:p>
@@ -2912,7 +2915,7 @@
           <a:p>
             <a:fld id="{261B4C4F-285E-6C44-A171-ECB61C3B6F37}" type="datetimeFigureOut">
               <a:rPr lang="en-US" smtClean="0"/>
-              <a:t>11/27/17</a:t>
+              <a:t>11/28/17</a:t>
             </a:fld>
             <a:endParaRPr lang="en-US"/>
           </a:p>
@@ -3125,7 +3128,7 @@
           <a:p>
             <a:fld id="{261B4C4F-285E-6C44-A171-ECB61C3B6F37}" type="datetimeFigureOut">
               <a:rPr lang="en-US" smtClean="0"/>
-              <a:t>11/27/17</a:t>
+              <a:t>11/28/17</a:t>
             </a:fld>
             <a:endParaRPr lang="en-US"/>
           </a:p>
@@ -3896,7 +3899,51 @@
           <a:bodyPr/>
           <a:lstStyle/>
           <a:p>
-            <a:endParaRPr lang="en-US"/>
+            <a:r>
+              <a:rPr lang="en-US" dirty="0" smtClean="0"/>
+              <a:t>Physical Memory</a:t>
+            </a:r>
+          </a:p>
+          <a:p>
+            <a:pPr lvl="1"/>
+            <a:r>
+              <a:rPr lang="en-US" dirty="0" smtClean="0"/>
+              <a:t>Separated into four zones</a:t>
+            </a:r>
+          </a:p>
+          <a:p>
+            <a:pPr lvl="1"/>
+            <a:r>
+              <a:rPr lang="en-US" dirty="0" smtClean="0"/>
+              <a:t>Managed by page allocators</a:t>
+            </a:r>
+          </a:p>
+          <a:p>
+            <a:pPr lvl="1"/>
+            <a:r>
+              <a:rPr lang="en-US" dirty="0" smtClean="0"/>
+              <a:t>Pages can be allocated contiguously using a buddy system.</a:t>
+            </a:r>
+          </a:p>
+          <a:p>
+            <a:pPr lvl="1"/>
+            <a:r>
+              <a:rPr lang="en-US" dirty="0" smtClean="0"/>
+              <a:t>Slabs are used for kernel data structures.</a:t>
+            </a:r>
+          </a:p>
+          <a:p>
+            <a:r>
+              <a:rPr lang="en-US" dirty="0" smtClean="0"/>
+              <a:t>Virtual Memory</a:t>
+            </a:r>
+          </a:p>
+          <a:p>
+            <a:r>
+              <a:rPr lang="en-US" dirty="0" smtClean="0"/>
+              <a:t>Page Swapping</a:t>
+            </a:r>
+            <a:endParaRPr lang="en-US" dirty="0"/>
           </a:p>
         </p:txBody>
       </p:sp>
@@ -4058,7 +4105,23 @@
           <a:p>
             <a:r>
               <a:rPr lang="en-US" dirty="0" smtClean="0"/>
-              <a:t>Real time policies: </a:t>
+              <a:t>Real </a:t>
+            </a:r>
+            <a:r>
+              <a:rPr lang="en-US" dirty="0" smtClean="0"/>
+              <a:t>Time </a:t>
+            </a:r>
+            <a:r>
+              <a:rPr lang="en-US" dirty="0"/>
+              <a:t>P</a:t>
+            </a:r>
+            <a:r>
+              <a:rPr lang="en-US" dirty="0" smtClean="0"/>
+              <a:t>olicies</a:t>
+            </a:r>
+            <a:r>
+              <a:rPr lang="en-US" dirty="0" smtClean="0"/>
+              <a:t>: </a:t>
             </a:r>
             <a:r>
               <a:rPr lang="en-US" dirty="0" smtClean="0">
@@ -4091,7 +4154,15 @@
           <a:p>
             <a:r>
               <a:rPr lang="en-US" dirty="0" smtClean="0"/>
-              <a:t>Normal policies: </a:t>
+              <a:t>Normal </a:t>
+            </a:r>
+            <a:r>
+              <a:rPr lang="en-US" dirty="0" smtClean="0"/>
+              <a:t>Policies</a:t>
+            </a:r>
+            <a:r>
+              <a:rPr lang="en-US" dirty="0" smtClean="0"/>
+              <a:t>: </a:t>
             </a:r>
             <a:r>
               <a:rPr lang="en-US" dirty="0" smtClean="0">

</xml_diff>